<commit_message>
Updated devGuide and portfolio
</commit_message>
<xml_diff>
--- a/docs/diagrams/LogicComponentSequenceDiagram.pptx
+++ b/docs/diagrams/LogicComponentSequenceDiagram.pptx
@@ -212,7 +212,7 @@
           <a:p>
             <a:fld id="{F5CC4B3F-88C1-4FFA-B1B6-F41C21DC6924}" type="datetimeFigureOut">
               <a:rPr lang="en-US" smtClean="0"/>
-              <a:t>7/11/2017</a:t>
+              <a:t>11/13/17</a:t>
             </a:fld>
             <a:endParaRPr lang="en-US"/>
           </a:p>
@@ -658,7 +658,7 @@
           <a:p>
             <a:fld id="{78C97017-6FC3-485B-9764-EAC9E56C1D49}" type="datetimeFigureOut">
               <a:rPr lang="en-US" smtClean="0"/>
-              <a:t>7/11/2017</a:t>
+              <a:t>11/13/17</a:t>
             </a:fld>
             <a:endParaRPr lang="en-US"/>
           </a:p>
@@ -826,7 +826,7 @@
           <a:p>
             <a:fld id="{78C97017-6FC3-485B-9764-EAC9E56C1D49}" type="datetimeFigureOut">
               <a:rPr lang="en-US" smtClean="0"/>
-              <a:t>7/11/2017</a:t>
+              <a:t>11/13/17</a:t>
             </a:fld>
             <a:endParaRPr lang="en-US"/>
           </a:p>
@@ -1004,7 +1004,7 @@
           <a:p>
             <a:fld id="{78C97017-6FC3-485B-9764-EAC9E56C1D49}" type="datetimeFigureOut">
               <a:rPr lang="en-US" smtClean="0"/>
-              <a:t>7/11/2017</a:t>
+              <a:t>11/13/17</a:t>
             </a:fld>
             <a:endParaRPr lang="en-US"/>
           </a:p>
@@ -1172,7 +1172,7 @@
           <a:p>
             <a:fld id="{78C97017-6FC3-485B-9764-EAC9E56C1D49}" type="datetimeFigureOut">
               <a:rPr lang="en-US" smtClean="0"/>
-              <a:t>7/11/2017</a:t>
+              <a:t>11/13/17</a:t>
             </a:fld>
             <a:endParaRPr lang="en-US"/>
           </a:p>
@@ -1417,7 +1417,7 @@
           <a:p>
             <a:fld id="{78C97017-6FC3-485B-9764-EAC9E56C1D49}" type="datetimeFigureOut">
               <a:rPr lang="en-US" smtClean="0"/>
-              <a:t>7/11/2017</a:t>
+              <a:t>11/13/17</a:t>
             </a:fld>
             <a:endParaRPr lang="en-US"/>
           </a:p>
@@ -1702,7 +1702,7 @@
           <a:p>
             <a:fld id="{78C97017-6FC3-485B-9764-EAC9E56C1D49}" type="datetimeFigureOut">
               <a:rPr lang="en-US" smtClean="0"/>
-              <a:t>7/11/2017</a:t>
+              <a:t>11/13/17</a:t>
             </a:fld>
             <a:endParaRPr lang="en-US"/>
           </a:p>
@@ -2121,7 +2121,7 @@
           <a:p>
             <a:fld id="{78C97017-6FC3-485B-9764-EAC9E56C1D49}" type="datetimeFigureOut">
               <a:rPr lang="en-US" smtClean="0"/>
-              <a:t>7/11/2017</a:t>
+              <a:t>11/13/17</a:t>
             </a:fld>
             <a:endParaRPr lang="en-US"/>
           </a:p>
@@ -2238,7 +2238,7 @@
           <a:p>
             <a:fld id="{78C97017-6FC3-485B-9764-EAC9E56C1D49}" type="datetimeFigureOut">
               <a:rPr lang="en-US" smtClean="0"/>
-              <a:t>7/11/2017</a:t>
+              <a:t>11/13/17</a:t>
             </a:fld>
             <a:endParaRPr lang="en-US"/>
           </a:p>
@@ -2333,7 +2333,7 @@
           <a:p>
             <a:fld id="{78C97017-6FC3-485B-9764-EAC9E56C1D49}" type="datetimeFigureOut">
               <a:rPr lang="en-US" smtClean="0"/>
-              <a:t>7/11/2017</a:t>
+              <a:t>11/13/17</a:t>
             </a:fld>
             <a:endParaRPr lang="en-US"/>
           </a:p>
@@ -2608,7 +2608,7 @@
           <a:p>
             <a:fld id="{78C97017-6FC3-485B-9764-EAC9E56C1D49}" type="datetimeFigureOut">
               <a:rPr lang="en-US" smtClean="0"/>
-              <a:t>7/11/2017</a:t>
+              <a:t>11/13/17</a:t>
             </a:fld>
             <a:endParaRPr lang="en-US"/>
           </a:p>
@@ -2860,7 +2860,7 @@
           <a:p>
             <a:fld id="{78C97017-6FC3-485B-9764-EAC9E56C1D49}" type="datetimeFigureOut">
               <a:rPr lang="en-US" smtClean="0"/>
-              <a:t>7/11/2017</a:t>
+              <a:t>11/13/17</a:t>
             </a:fld>
             <a:endParaRPr lang="en-US"/>
           </a:p>
@@ -3071,7 +3071,7 @@
           <a:p>
             <a:fld id="{78C97017-6FC3-485B-9764-EAC9E56C1D49}" type="datetimeFigureOut">
               <a:rPr lang="en-US" smtClean="0"/>
-              <a:t>7/11/2017</a:t>
+              <a:t>11/13/17</a:t>
             </a:fld>
             <a:endParaRPr lang="en-US"/>
           </a:p>
@@ -3702,7 +3702,7 @@
           <a:p>
             <a:pPr algn="ctr"/>
             <a:r>
-              <a:rPr lang="en-US" sz="1600" dirty="0">
+              <a:rPr lang="en-US" sz="1600" dirty="0" smtClean="0">
                 <a:solidFill>
                   <a:schemeClr val="bg1"/>
                 </a:solidFill>
@@ -3713,7 +3713,7 @@
           <a:p>
             <a:pPr algn="ctr"/>
             <a:r>
-              <a:rPr lang="en-US" sz="1600" dirty="0" err="1">
+              <a:rPr lang="en-US" sz="1600" dirty="0" err="1" smtClean="0">
                 <a:solidFill>
                   <a:schemeClr val="bg1"/>
                 </a:solidFill>
@@ -3860,12 +3860,20 @@
           <a:p>
             <a:pPr algn="ctr"/>
             <a:r>
+              <a:rPr lang="en-US" sz="1600" dirty="0" smtClean="0">
+                <a:solidFill>
+                  <a:schemeClr val="bg1"/>
+                </a:solidFill>
+              </a:rPr>
+              <a:t>:avatar</a:t>
+            </a:r>
+            <a:r>
               <a:rPr lang="en-US" sz="1600" dirty="0">
                 <a:solidFill>
                   <a:schemeClr val="bg1"/>
                 </a:solidFill>
               </a:rPr>
-              <a:t>d:Delete</a:t>
+              <a:t/>
             </a:r>
             <a:br>
               <a:rPr lang="en-US" sz="1600" dirty="0">
@@ -4056,8 +4064,8 @@
         </p:nvSpPr>
         <p:spPr>
           <a:xfrm>
-            <a:off x="0" y="2743200"/>
-            <a:ext cx="1424846" cy="215444"/>
+            <a:off x="-544325" y="2745173"/>
+            <a:ext cx="2045176" cy="184666"/>
           </a:xfrm>
           <a:prstGeom prst="rect">
             <a:avLst/>
@@ -4072,13 +4080,42 @@
           <a:p>
             <a:pPr algn="r"/>
             <a:r>
-              <a:rPr lang="en-US" sz="1400" dirty="0">
+              <a:rPr lang="en-US" sz="1200" dirty="0">
                 <a:solidFill>
                   <a:srgbClr val="0070C0"/>
                 </a:solidFill>
               </a:rPr>
-              <a:t>execute(“delete 1”)</a:t>
-            </a:r>
+              <a:t>execute</a:t>
+            </a:r>
+            <a:r>
+              <a:rPr lang="en-US" sz="1200" dirty="0" smtClean="0">
+                <a:solidFill>
+                  <a:srgbClr val="0070C0"/>
+                </a:solidFill>
+              </a:rPr>
+              <a:t>(“avatar 1 </a:t>
+            </a:r>
+            <a:r>
+              <a:rPr lang="en-US" sz="1200" dirty="0" err="1" smtClean="0">
+                <a:solidFill>
+                  <a:srgbClr val="0070C0"/>
+                </a:solidFill>
+              </a:rPr>
+              <a:t>url</a:t>
+            </a:r>
+            <a:r>
+              <a:rPr lang="en-US" sz="1200" dirty="0" smtClean="0">
+                <a:solidFill>
+                  <a:srgbClr val="0070C0"/>
+                </a:solidFill>
+              </a:rPr>
+              <a:t>”)</a:t>
+            </a:r>
+            <a:endParaRPr lang="en-US" sz="1200" dirty="0">
+              <a:solidFill>
+                <a:srgbClr val="0070C0"/>
+              </a:solidFill>
+            </a:endParaRPr>
           </a:p>
         </p:txBody>
       </p:sp>
@@ -4640,8 +4677,8 @@
         </p:nvSpPr>
         <p:spPr>
           <a:xfrm>
-            <a:off x="6984957" y="4267200"/>
-            <a:ext cx="1424846" cy="215444"/>
+            <a:off x="7018168" y="4052994"/>
+            <a:ext cx="1424846" cy="430887"/>
           </a:xfrm>
           <a:prstGeom prst="rect">
             <a:avLst/>
@@ -4666,21 +4703,36 @@
           </a:lstStyle>
           <a:p>
             <a:r>
-              <a:rPr lang="en-US" dirty="0" err="1">
+              <a:rPr lang="en-US" dirty="0" err="1" smtClean="0">
                 <a:solidFill>
                   <a:srgbClr val="7030A0"/>
                 </a:solidFill>
               </a:rPr>
-              <a:t>deletePerson</a:t>
-            </a:r>
-            <a:r>
-              <a:rPr lang="en-US" dirty="0">
+              <a:t>extractUrl</a:t>
+            </a:r>
+            <a:r>
+              <a:rPr lang="en-US" dirty="0" smtClean="0">
                 <a:solidFill>
                   <a:srgbClr val="7030A0"/>
                 </a:solidFill>
               </a:rPr>
-              <a:t>(p)</a:t>
-            </a:r>
+              <a:t>()</a:t>
+            </a:r>
+          </a:p>
+          <a:p>
+            <a:r>
+              <a:rPr lang="en-US" dirty="0" err="1" smtClean="0">
+                <a:solidFill>
+                  <a:srgbClr val="7030A0"/>
+                </a:solidFill>
+              </a:rPr>
+              <a:t>extractPersonIndex</a:t>
+            </a:r>
+            <a:endParaRPr lang="en-US" dirty="0">
+              <a:solidFill>
+                <a:srgbClr val="7030A0"/>
+              </a:solidFill>
+            </a:endParaRPr>
           </a:p>
         </p:txBody>
       </p:sp>
@@ -4693,7 +4745,7 @@
         <p:spPr>
           <a:xfrm>
             <a:off x="3847551" y="3657600"/>
-            <a:ext cx="767033" cy="184666"/>
+            <a:ext cx="988178" cy="184666"/>
           </a:xfrm>
           <a:prstGeom prst="rect">
             <a:avLst/>
@@ -4719,8 +4771,21 @@
           <a:p>
             <a:r>
               <a:rPr lang="en-US" sz="1200" dirty="0"/>
-              <a:t>parse(“1”)</a:t>
-            </a:r>
+              <a:t>parse</a:t>
+            </a:r>
+            <a:r>
+              <a:rPr lang="en-US" sz="1200" dirty="0" smtClean="0"/>
+              <a:t>(“1 </a:t>
+            </a:r>
+            <a:r>
+              <a:rPr lang="en-US" sz="1200" dirty="0" err="1" smtClean="0"/>
+              <a:t>url</a:t>
+            </a:r>
+            <a:r>
+              <a:rPr lang="en-US" sz="1200" dirty="0" smtClean="0"/>
+              <a:t>”)</a:t>
+            </a:r>
+            <a:endParaRPr lang="en-US" sz="1200" dirty="0"/>
           </a:p>
         </p:txBody>
       </p:sp>
@@ -4732,8 +4797,8 @@
         </p:nvSpPr>
         <p:spPr>
           <a:xfrm>
-            <a:off x="1742982" y="2850922"/>
-            <a:ext cx="1424846" cy="215444"/>
+            <a:off x="1326111" y="2850922"/>
+            <a:ext cx="1841717" cy="215444"/>
           </a:xfrm>
           <a:prstGeom prst="rect">
             <a:avLst/>
@@ -4759,8 +4824,21 @@
           <a:p>
             <a:r>
               <a:rPr lang="en-US" dirty="0"/>
-              <a:t>parse(“delete 1”)</a:t>
-            </a:r>
+              <a:t>parse</a:t>
+            </a:r>
+            <a:r>
+              <a:rPr lang="en-US" dirty="0" smtClean="0"/>
+              <a:t>(“avatar 1 </a:t>
+            </a:r>
+            <a:r>
+              <a:rPr lang="en-US" dirty="0" err="1" smtClean="0"/>
+              <a:t>url</a:t>
+            </a:r>
+            <a:r>
+              <a:rPr lang="en-US" dirty="0" smtClean="0"/>
+              <a:t>”)</a:t>
+            </a:r>
+            <a:endParaRPr lang="en-US" dirty="0"/>
           </a:p>
         </p:txBody>
       </p:sp>
@@ -5085,15 +5163,15 @@
                   <a:schemeClr val="bg1"/>
                 </a:solidFill>
               </a:rPr>
-              <a:t>:</a:t>
-            </a:r>
-            <a:r>
-              <a:rPr lang="en-US" sz="1600" dirty="0" err="1">
+              <a:t>::</a:t>
+            </a:r>
+            <a:r>
+              <a:rPr lang="en-US" sz="1600" dirty="0" err="1" smtClean="0">
                 <a:solidFill>
                   <a:schemeClr val="bg1"/>
                 </a:solidFill>
               </a:rPr>
-              <a:t>DeleteCommand</a:t>
+              <a:t>AvatarCommand</a:t>
             </a:r>
             <a:endParaRPr lang="en-US" sz="1600" dirty="0">
               <a:solidFill>

</xml_diff>